<commit_message>
several changes made into file and other files added
</commit_message>
<xml_diff>
--- a/Icons/MainPageDes.png.pptx
+++ b/Icons/MainPageDes.png.pptx
@@ -7,8 +7,9 @@
   <p:sldIdLst>
     <p:sldId id="256" r:id="rId2"/>
     <p:sldId id="257" r:id="rId3"/>
-    <p:sldId id="258" r:id="rId4"/>
-    <p:sldId id="259" r:id="rId5"/>
+    <p:sldId id="260" r:id="rId4"/>
+    <p:sldId id="258" r:id="rId5"/>
+    <p:sldId id="259" r:id="rId6"/>
   </p:sldIdLst>
   <p:sldSz cx="12192000" cy="6858000"/>
   <p:notesSz cx="6858000" cy="9144000"/>
@@ -408,7 +409,7 @@
           <a:p>
             <a:fld id="{65676E10-0205-46D8-8D37-2BFDD7B06771}" type="datetimeFigureOut">
               <a:rPr lang="en-US" smtClean="0"/>
-              <a:t>2/3/2025</a:t>
+              <a:t>2/4/2025</a:t>
             </a:fld>
             <a:endParaRPr lang="en-US"/>
           </a:p>
@@ -606,7 +607,7 @@
           <a:p>
             <a:fld id="{65676E10-0205-46D8-8D37-2BFDD7B06771}" type="datetimeFigureOut">
               <a:rPr lang="en-US" smtClean="0"/>
-              <a:t>2/3/2025</a:t>
+              <a:t>2/4/2025</a:t>
             </a:fld>
             <a:endParaRPr lang="en-US"/>
           </a:p>
@@ -814,7 +815,7 @@
           <a:p>
             <a:fld id="{65676E10-0205-46D8-8D37-2BFDD7B06771}" type="datetimeFigureOut">
               <a:rPr lang="en-US" smtClean="0"/>
-              <a:t>2/3/2025</a:t>
+              <a:t>2/4/2025</a:t>
             </a:fld>
             <a:endParaRPr lang="en-US"/>
           </a:p>
@@ -1012,7 +1013,7 @@
           <a:p>
             <a:fld id="{65676E10-0205-46D8-8D37-2BFDD7B06771}" type="datetimeFigureOut">
               <a:rPr lang="en-US" smtClean="0"/>
-              <a:t>2/3/2025</a:t>
+              <a:t>2/4/2025</a:t>
             </a:fld>
             <a:endParaRPr lang="en-US"/>
           </a:p>
@@ -1287,7 +1288,7 @@
           <a:p>
             <a:fld id="{65676E10-0205-46D8-8D37-2BFDD7B06771}" type="datetimeFigureOut">
               <a:rPr lang="en-US" smtClean="0"/>
-              <a:t>2/3/2025</a:t>
+              <a:t>2/4/2025</a:t>
             </a:fld>
             <a:endParaRPr lang="en-US"/>
           </a:p>
@@ -1552,7 +1553,7 @@
           <a:p>
             <a:fld id="{65676E10-0205-46D8-8D37-2BFDD7B06771}" type="datetimeFigureOut">
               <a:rPr lang="en-US" smtClean="0"/>
-              <a:t>2/3/2025</a:t>
+              <a:t>2/4/2025</a:t>
             </a:fld>
             <a:endParaRPr lang="en-US"/>
           </a:p>
@@ -1964,7 +1965,7 @@
           <a:p>
             <a:fld id="{65676E10-0205-46D8-8D37-2BFDD7B06771}" type="datetimeFigureOut">
               <a:rPr lang="en-US" smtClean="0"/>
-              <a:t>2/3/2025</a:t>
+              <a:t>2/4/2025</a:t>
             </a:fld>
             <a:endParaRPr lang="en-US"/>
           </a:p>
@@ -2105,7 +2106,7 @@
           <a:p>
             <a:fld id="{65676E10-0205-46D8-8D37-2BFDD7B06771}" type="datetimeFigureOut">
               <a:rPr lang="en-US" smtClean="0"/>
-              <a:t>2/3/2025</a:t>
+              <a:t>2/4/2025</a:t>
             </a:fld>
             <a:endParaRPr lang="en-US"/>
           </a:p>
@@ -2218,7 +2219,7 @@
           <a:p>
             <a:fld id="{65676E10-0205-46D8-8D37-2BFDD7B06771}" type="datetimeFigureOut">
               <a:rPr lang="en-US" smtClean="0"/>
-              <a:t>2/3/2025</a:t>
+              <a:t>2/4/2025</a:t>
             </a:fld>
             <a:endParaRPr lang="en-US"/>
           </a:p>
@@ -2529,7 +2530,7 @@
           <a:p>
             <a:fld id="{65676E10-0205-46D8-8D37-2BFDD7B06771}" type="datetimeFigureOut">
               <a:rPr lang="en-US" smtClean="0"/>
-              <a:t>2/3/2025</a:t>
+              <a:t>2/4/2025</a:t>
             </a:fld>
             <a:endParaRPr lang="en-US"/>
           </a:p>
@@ -2817,7 +2818,7 @@
           <a:p>
             <a:fld id="{65676E10-0205-46D8-8D37-2BFDD7B06771}" type="datetimeFigureOut">
               <a:rPr lang="en-US" smtClean="0"/>
-              <a:t>2/3/2025</a:t>
+              <a:t>2/4/2025</a:t>
             </a:fld>
             <a:endParaRPr lang="en-US"/>
           </a:p>
@@ -3058,7 +3059,7 @@
           <a:p>
             <a:fld id="{65676E10-0205-46D8-8D37-2BFDD7B06771}" type="datetimeFigureOut">
               <a:rPr lang="en-US" smtClean="0"/>
-              <a:t>2/3/2025</a:t>
+              <a:t>2/4/2025</a:t>
             </a:fld>
             <a:endParaRPr lang="en-US"/>
           </a:p>
@@ -3991,6 +3992,280 @@
         <p:cNvPr id="1" name="">
           <a:extLst>
             <a:ext uri="{FF2B5EF4-FFF2-40B4-BE49-F238E27FC236}">
+              <a16:creationId xmlns:a16="http://schemas.microsoft.com/office/drawing/2014/main" id="{933B49D1-88AC-0F83-98AD-7F98C37555B0}"/>
+            </a:ext>
+          </a:extLst>
+        </p:cNvPr>
+        <p:cNvGrpSpPr/>
+        <p:nvPr/>
+      </p:nvGrpSpPr>
+      <p:grpSpPr>
+        <a:xfrm>
+          <a:off x="0" y="0"/>
+          <a:ext cx="0" cy="0"/>
+          <a:chOff x="0" y="0"/>
+          <a:chExt cx="0" cy="0"/>
+        </a:xfrm>
+      </p:grpSpPr>
+      <p:sp>
+        <p:nvSpPr>
+          <p:cNvPr id="4" name="Rectangle: Rounded Corners 3">
+            <a:extLst>
+              <a:ext uri="{FF2B5EF4-FFF2-40B4-BE49-F238E27FC236}">
+                <a16:creationId xmlns:a16="http://schemas.microsoft.com/office/drawing/2014/main" id="{2006BBB1-421D-EBEA-5177-F7F7D2BFD908}"/>
+              </a:ext>
+            </a:extLst>
+          </p:cNvPr>
+          <p:cNvSpPr/>
+          <p:nvPr/>
+        </p:nvSpPr>
+        <p:spPr>
+          <a:xfrm>
+            <a:off x="1" y="963561"/>
+            <a:ext cx="12192000" cy="963562"/>
+          </a:xfrm>
+          <a:prstGeom prst="roundRect">
+            <a:avLst>
+              <a:gd name="adj" fmla="val 38096"/>
+            </a:avLst>
+          </a:prstGeom>
+          <a:gradFill>
+            <a:gsLst>
+              <a:gs pos="0">
+                <a:schemeClr val="accent1">
+                  <a:lumMod val="67000"/>
+                </a:schemeClr>
+              </a:gs>
+              <a:gs pos="29000">
+                <a:schemeClr val="accent1">
+                  <a:lumMod val="97000"/>
+                  <a:lumOff val="3000"/>
+                </a:schemeClr>
+              </a:gs>
+              <a:gs pos="100000">
+                <a:schemeClr val="accent1">
+                  <a:lumMod val="60000"/>
+                  <a:lumOff val="40000"/>
+                </a:schemeClr>
+              </a:gs>
+            </a:gsLst>
+            <a:lin ang="16200000" scaled="1"/>
+          </a:gradFill>
+        </p:spPr>
+        <p:style>
+          <a:lnRef idx="2">
+            <a:schemeClr val="accent1">
+              <a:shade val="15000"/>
+            </a:schemeClr>
+          </a:lnRef>
+          <a:fillRef idx="1">
+            <a:schemeClr val="accent1"/>
+          </a:fillRef>
+          <a:effectRef idx="0">
+            <a:schemeClr val="accent1"/>
+          </a:effectRef>
+          <a:fontRef idx="minor">
+            <a:schemeClr val="lt1"/>
+          </a:fontRef>
+        </p:style>
+        <p:txBody>
+          <a:bodyPr rtlCol="0" anchor="ctr"/>
+          <a:lstStyle/>
+          <a:p>
+            <a:pPr algn="ctr"/>
+            <a:endParaRPr lang="en-US"/>
+          </a:p>
+        </p:txBody>
+      </p:sp>
+      <p:sp>
+        <p:nvSpPr>
+          <p:cNvPr id="6" name="Rectangle: Rounded Corners 5">
+            <a:extLst>
+              <a:ext uri="{FF2B5EF4-FFF2-40B4-BE49-F238E27FC236}">
+                <a16:creationId xmlns:a16="http://schemas.microsoft.com/office/drawing/2014/main" id="{86270B44-B77F-455E-769A-A50C9F153070}"/>
+              </a:ext>
+            </a:extLst>
+          </p:cNvPr>
+          <p:cNvSpPr/>
+          <p:nvPr/>
+        </p:nvSpPr>
+        <p:spPr>
+          <a:xfrm>
+            <a:off x="1" y="4395019"/>
+            <a:ext cx="12192000" cy="2462981"/>
+          </a:xfrm>
+          <a:prstGeom prst="roundRect">
+            <a:avLst>
+              <a:gd name="adj" fmla="val 7260"/>
+            </a:avLst>
+          </a:prstGeom>
+          <a:gradFill>
+            <a:gsLst>
+              <a:gs pos="0">
+                <a:schemeClr val="accent1">
+                  <a:lumMod val="67000"/>
+                </a:schemeClr>
+              </a:gs>
+              <a:gs pos="24000">
+                <a:schemeClr val="accent1">
+                  <a:lumMod val="97000"/>
+                  <a:lumOff val="3000"/>
+                </a:schemeClr>
+              </a:gs>
+              <a:gs pos="100000">
+                <a:schemeClr val="accent1">
+                  <a:lumMod val="60000"/>
+                  <a:lumOff val="40000"/>
+                </a:schemeClr>
+              </a:gs>
+            </a:gsLst>
+            <a:lin ang="16200000" scaled="1"/>
+          </a:gradFill>
+        </p:spPr>
+        <p:style>
+          <a:lnRef idx="2">
+            <a:schemeClr val="accent1">
+              <a:shade val="15000"/>
+            </a:schemeClr>
+          </a:lnRef>
+          <a:fillRef idx="1">
+            <a:schemeClr val="accent1"/>
+          </a:fillRef>
+          <a:effectRef idx="0">
+            <a:schemeClr val="accent1"/>
+          </a:effectRef>
+          <a:fontRef idx="minor">
+            <a:schemeClr val="lt1"/>
+          </a:fontRef>
+        </p:style>
+        <p:txBody>
+          <a:bodyPr rtlCol="0" anchor="ctr"/>
+          <a:lstStyle/>
+          <a:p>
+            <a:pPr algn="ctr"/>
+            <a:endParaRPr lang="en-US"/>
+          </a:p>
+        </p:txBody>
+      </p:sp>
+      <p:sp>
+        <p:nvSpPr>
+          <p:cNvPr id="7" name="Rectangle: Rounded Corners 6">
+            <a:extLst>
+              <a:ext uri="{FF2B5EF4-FFF2-40B4-BE49-F238E27FC236}">
+                <a16:creationId xmlns:a16="http://schemas.microsoft.com/office/drawing/2014/main" id="{77BA000A-3452-943A-09E1-1E8E2F2277A0}"/>
+              </a:ext>
+            </a:extLst>
+          </p:cNvPr>
+          <p:cNvSpPr/>
+          <p:nvPr/>
+        </p:nvSpPr>
+        <p:spPr>
+          <a:xfrm>
+            <a:off x="1" y="1927123"/>
+            <a:ext cx="12192000" cy="2462981"/>
+          </a:xfrm>
+          <a:prstGeom prst="roundRect">
+            <a:avLst>
+              <a:gd name="adj" fmla="val 9082"/>
+            </a:avLst>
+          </a:prstGeom>
+          <a:gradFill>
+            <a:gsLst>
+              <a:gs pos="0">
+                <a:schemeClr val="accent1">
+                  <a:lumMod val="67000"/>
+                </a:schemeClr>
+              </a:gs>
+              <a:gs pos="29000">
+                <a:schemeClr val="accent1">
+                  <a:lumMod val="97000"/>
+                  <a:lumOff val="3000"/>
+                </a:schemeClr>
+              </a:gs>
+              <a:gs pos="100000">
+                <a:schemeClr val="accent1">
+                  <a:lumMod val="60000"/>
+                  <a:lumOff val="40000"/>
+                </a:schemeClr>
+              </a:gs>
+            </a:gsLst>
+            <a:lin ang="16200000" scaled="1"/>
+          </a:gradFill>
+        </p:spPr>
+        <p:style>
+          <a:lnRef idx="2">
+            <a:schemeClr val="accent1">
+              <a:shade val="15000"/>
+            </a:schemeClr>
+          </a:lnRef>
+          <a:fillRef idx="1">
+            <a:schemeClr val="accent1"/>
+          </a:fillRef>
+          <a:effectRef idx="0">
+            <a:schemeClr val="accent1"/>
+          </a:effectRef>
+          <a:fontRef idx="minor">
+            <a:schemeClr val="lt1"/>
+          </a:fontRef>
+        </p:style>
+        <p:txBody>
+          <a:bodyPr rtlCol="0" anchor="ctr"/>
+          <a:lstStyle/>
+          <a:p>
+            <a:pPr algn="ctr"/>
+            <a:endParaRPr lang="en-US"/>
+          </a:p>
+        </p:txBody>
+      </p:sp>
+    </p:spTree>
+    <p:extLst>
+      <p:ext uri="{BB962C8B-B14F-4D97-AF65-F5344CB8AC3E}">
+        <p14:creationId xmlns:p14="http://schemas.microsoft.com/office/powerpoint/2010/main" val="1016946585"/>
+      </p:ext>
+    </p:extLst>
+  </p:cSld>
+  <p:clrMapOvr>
+    <a:masterClrMapping/>
+  </p:clrMapOvr>
+</p:sld>
+</file>
+
+<file path=ppt/slides/slide4.xml><?xml version="1.0" encoding="utf-8"?>
+<p:sld xmlns:a="http://schemas.openxmlformats.org/drawingml/2006/main" xmlns:r="http://schemas.openxmlformats.org/officeDocument/2006/relationships" xmlns:p="http://schemas.openxmlformats.org/presentationml/2006/main">
+  <p:cSld>
+    <p:bg>
+      <p:bgPr>
+        <a:gradFill flip="none" rotWithShape="1">
+          <a:gsLst>
+            <a:gs pos="0">
+              <a:schemeClr val="accent1">
+                <a:lumMod val="67000"/>
+              </a:schemeClr>
+            </a:gs>
+            <a:gs pos="48000">
+              <a:schemeClr val="accent1">
+                <a:lumMod val="97000"/>
+                <a:lumOff val="3000"/>
+              </a:schemeClr>
+            </a:gs>
+            <a:gs pos="100000">
+              <a:schemeClr val="accent1">
+                <a:lumMod val="60000"/>
+                <a:lumOff val="40000"/>
+              </a:schemeClr>
+            </a:gs>
+          </a:gsLst>
+          <a:lin ang="16200000" scaled="1"/>
+          <a:tileRect/>
+        </a:gradFill>
+        <a:effectLst/>
+      </p:bgPr>
+    </p:bg>
+    <p:spTree>
+      <p:nvGrpSpPr>
+        <p:cNvPr id="1" name="">
+          <a:extLst>
+            <a:ext uri="{FF2B5EF4-FFF2-40B4-BE49-F238E27FC236}">
               <a16:creationId xmlns:a16="http://schemas.microsoft.com/office/drawing/2014/main" id="{B568D5A1-05DA-5BA1-1E69-19781E9EBA87}"/>
             </a:ext>
           </a:extLst>
@@ -4251,7 +4526,7 @@
 </p:sld>
 </file>
 
-<file path=ppt/slides/slide4.xml><?xml version="1.0" encoding="utf-8"?>
+<file path=ppt/slides/slide5.xml><?xml version="1.0" encoding="utf-8"?>
 <p:sld xmlns:a="http://schemas.openxmlformats.org/drawingml/2006/main" xmlns:r="http://schemas.openxmlformats.org/officeDocument/2006/relationships" xmlns:p="http://schemas.openxmlformats.org/presentationml/2006/main">
   <p:cSld>
     <p:bg>

</xml_diff>